<commit_message>
14/12/2022 - Omar - Último commit
</commit_message>
<xml_diff>
--- a/doc/IPS2022-PL71-Presentacion.pptx
+++ b/doc/IPS2022-PL71-Presentacion.pptx
@@ -4834,7 +4834,6 @@
               <a:rPr lang="es-ES" dirty="0"/>
               <a:t> </a:t>
             </a:r>
-            <a:endParaRPr lang="es-ES" dirty="0"/>
           </a:p>
         </p:txBody>
       </p:sp>
@@ -5048,11 +5047,7 @@
             <a:pPr rtl="0"/>
             <a:r>
               <a:rPr lang="es-ES" dirty="0" smtClean="0"/>
-              <a:t>A llevar a cabo reuniones y revisione</a:t>
-            </a:r>
-            <a:r>
-              <a:rPr lang="es-ES" dirty="0" smtClean="0"/>
-              <a:t>s del trabajo desarrollado.</a:t>
+              <a:t>A llevar a cabo reuniones y revisiones del trabajo desarrollado.</a:t>
             </a:r>
           </a:p>
           <a:p>
@@ -5191,11 +5186,7 @@
             <a:pPr rtl="0"/>
             <a:r>
               <a:rPr lang="es-ES" dirty="0" smtClean="0"/>
-              <a:t>Mantener el control a la hora de la realizaci</a:t>
-            </a:r>
-            <a:r>
-              <a:rPr lang="es-ES" dirty="0" smtClean="0"/>
-              <a:t>ón de tareas paralelas en Github.</a:t>
+              <a:t>Mantener el control a la hora de la realización de tareas paralelas en Github.</a:t>
             </a:r>
           </a:p>
           <a:p>
@@ -6111,8 +6102,8 @@
               <a:t>Si tienen alguna pregunta, no duden en </a:t>
             </a:r>
             <a:r>
-              <a:rPr lang="es-ES" dirty="0" err="1" smtClean="0"/>
-              <a:t>hacernosla</a:t>
+              <a:rPr lang="es-ES" dirty="0" smtClean="0"/>
+              <a:t>hacerla</a:t>
             </a:r>
             <a:r>
               <a:rPr lang="es-ES" dirty="0" smtClean="0"/>
@@ -6937,6 +6928,17 @@
 </file>
 
 <file path=customXml/item2.xml><?xml version="1.0" encoding="utf-8"?>
+<p:properties xmlns:p="http://schemas.microsoft.com/office/2006/metadata/properties" xmlns:xsi="http://www.w3.org/2001/XMLSchema-instance" xmlns:pc="http://schemas.microsoft.com/office/infopath/2007/PartnerControls">
+  <documentManagement>
+    <VSO_x0020_item_x0020_id xmlns="40262f94-9f35-4ac3-9a90-690165a166b7" xsi:nil="true"/>
+    <Assetid_x0020_ xmlns="40262f94-9f35-4ac3-9a90-690165a166b7" xsi:nil="true"/>
+    <Item_x0020_Details xmlns="40262f94-9f35-4ac3-9a90-690165a166b7" xsi:nil="true"/>
+    <Template_x0020_details xmlns="40262f94-9f35-4ac3-9a90-690165a166b7" xsi:nil="true"/>
+  </documentManagement>
+</p:properties>
+</file>
+
+<file path=customXml/item3.xml><?xml version="1.0" encoding="utf-8"?>
 <ct:contentTypeSchema xmlns:ct="http://schemas.microsoft.com/office/2006/metadata/contentType" xmlns:ma="http://schemas.microsoft.com/office/2006/metadata/properties/metaAttributes" ct:_="" ma:_="" ma:contentTypeName="Document" ma:contentTypeID="0x010100AA3F7D94069FF64A86F7DFF56D60E3BE" ma:contentTypeVersion="6" ma:contentTypeDescription="Create a new document." ma:contentTypeScope="" ma:versionID="c32302c77d4085ecf495bdddb7f5e889">
   <xsd:schema xmlns:xsd="http://www.w3.org/2001/XMLSchema" xmlns:xs="http://www.w3.org/2001/XMLSchema" xmlns:p="http://schemas.microsoft.com/office/2006/metadata/properties" xmlns:ns2="a4f35948-e619-41b3-aa29-22878b09cfd2" xmlns:ns3="40262f94-9f35-4ac3-9a90-690165a166b7" targetNamespace="http://schemas.microsoft.com/office/2006/metadata/properties" ma:root="true" ma:fieldsID="4ab5ae46be95f9d0be6107e8200be7a2" ns2:_="" ns3:_="">
     <xsd:import namespace="a4f35948-e619-41b3-aa29-22878b09cfd2"/>
@@ -7117,17 +7119,6 @@
 </ct:contentTypeSchema>
 </file>
 
-<file path=customXml/item3.xml><?xml version="1.0" encoding="utf-8"?>
-<p:properties xmlns:p="http://schemas.microsoft.com/office/2006/metadata/properties" xmlns:xsi="http://www.w3.org/2001/XMLSchema-instance" xmlns:pc="http://schemas.microsoft.com/office/infopath/2007/PartnerControls">
-  <documentManagement>
-    <VSO_x0020_item_x0020_id xmlns="40262f94-9f35-4ac3-9a90-690165a166b7" xsi:nil="true"/>
-    <Assetid_x0020_ xmlns="40262f94-9f35-4ac3-9a90-690165a166b7" xsi:nil="true"/>
-    <Item_x0020_Details xmlns="40262f94-9f35-4ac3-9a90-690165a166b7" xsi:nil="true"/>
-    <Template_x0020_details xmlns="40262f94-9f35-4ac3-9a90-690165a166b7" xsi:nil="true"/>
-  </documentManagement>
-</p:properties>
-</file>
-
 <file path=customXml/itemProps1.xml><?xml version="1.0" encoding="utf-8"?>
 <ds:datastoreItem xmlns:ds="http://schemas.openxmlformats.org/officeDocument/2006/customXml" ds:itemID="{02F2BE50-DDB3-465B-A26E-975A276D4362}">
   <ds:schemaRefs>
@@ -7137,6 +7128,23 @@
 </file>
 
 <file path=customXml/itemProps2.xml><?xml version="1.0" encoding="utf-8"?>
+<ds:datastoreItem xmlns:ds="http://schemas.openxmlformats.org/officeDocument/2006/customXml" ds:itemID="{99220E13-D325-4A9E-AA7A-0D1409275EB9}">
+  <ds:schemaRefs>
+    <ds:schemaRef ds:uri="a4f35948-e619-41b3-aa29-22878b09cfd2"/>
+    <ds:schemaRef ds:uri="http://schemas.microsoft.com/office/infopath/2007/PartnerControls"/>
+    <ds:schemaRef ds:uri="http://schemas.microsoft.com/office/2006/documentManagement/types"/>
+    <ds:schemaRef ds:uri="http://schemas.microsoft.com/office/2006/metadata/properties"/>
+    <ds:schemaRef ds:uri="http://purl.org/dc/dcmitype/"/>
+    <ds:schemaRef ds:uri="http://purl.org/dc/elements/1.1/"/>
+    <ds:schemaRef ds:uri="http://www.w3.org/XML/1998/namespace"/>
+    <ds:schemaRef ds:uri="http://schemas.openxmlformats.org/package/2006/metadata/core-properties"/>
+    <ds:schemaRef ds:uri="40262f94-9f35-4ac3-9a90-690165a166b7"/>
+    <ds:schemaRef ds:uri="http://purl.org/dc/terms/"/>
+  </ds:schemaRefs>
+</ds:datastoreItem>
+</file>
+
+<file path=customXml/itemProps3.xml><?xml version="1.0" encoding="utf-8"?>
 <ds:datastoreItem xmlns:ds="http://schemas.openxmlformats.org/officeDocument/2006/customXml" ds:itemID="{7C80FAF7-F941-4D3E-A3C3-283A61107933}">
   <ds:schemaRefs>
     <ds:schemaRef ds:uri="http://schemas.microsoft.com/office/2006/metadata/contentType"/>
@@ -7153,21 +7161,4 @@
     <ds:schemaRef ds:uri="http://schemas.microsoft.com/internal/obd"/>
   </ds:schemaRefs>
 </ds:datastoreItem>
-</file>
-
-<file path=customXml/itemProps3.xml><?xml version="1.0" encoding="utf-8"?>
-<ds:datastoreItem xmlns:ds="http://schemas.openxmlformats.org/officeDocument/2006/customXml" ds:itemID="{99220E13-D325-4A9E-AA7A-0D1409275EB9}">
-  <ds:schemaRefs>
-    <ds:schemaRef ds:uri="a4f35948-e619-41b3-aa29-22878b09cfd2"/>
-    <ds:schemaRef ds:uri="http://schemas.microsoft.com/office/infopath/2007/PartnerControls"/>
-    <ds:schemaRef ds:uri="http://schemas.microsoft.com/office/2006/documentManagement/types"/>
-    <ds:schemaRef ds:uri="http://schemas.microsoft.com/office/2006/metadata/properties"/>
-    <ds:schemaRef ds:uri="http://purl.org/dc/dcmitype/"/>
-    <ds:schemaRef ds:uri="http://purl.org/dc/elements/1.1/"/>
-    <ds:schemaRef ds:uri="http://www.w3.org/XML/1998/namespace"/>
-    <ds:schemaRef ds:uri="http://schemas.openxmlformats.org/package/2006/metadata/core-properties"/>
-    <ds:schemaRef ds:uri="40262f94-9f35-4ac3-9a90-690165a166b7"/>
-    <ds:schemaRef ds:uri="http://purl.org/dc/terms/"/>
-  </ds:schemaRefs>
-</ds:datastoreItem>
 </file>
</xml_diff>